<commit_message>
Added link to repo
</commit_message>
<xml_diff>
--- a/TDD para Dynamics CE - CDS.pptx
+++ b/TDD para Dynamics CE - CDS.pptx
@@ -16534,6 +16534,24 @@
               <a:t>DEMO</a:t>
             </a:r>
           </a:p>
+          <a:p>
+            <a:pPr marL="0" indent="0" algn="ctr">
+              <a:buNone/>
+            </a:pPr>
+            <a:endParaRPr lang="es-ES" sz="6000" dirty="0"/>
+          </a:p>
+          <a:p>
+            <a:pPr marL="0" indent="0" algn="ctr">
+              <a:buNone/>
+            </a:pPr>
+            <a:r>
+              <a:rPr lang="es-ES" sz="2400" dirty="0">
+                <a:hlinkClick r:id="rId2"/>
+              </a:rPr>
+              <a:t>https://github.com/jordimontana82/365saturday-madrid-2019</a:t>
+            </a:r>
+            <a:endParaRPr lang="es-ES" sz="2400" dirty="0"/>
+          </a:p>
         </p:txBody>
       </p:sp>
     </p:spTree>

</xml_diff>

<commit_message>
Added demo screenshots for fakexrmeasy
</commit_message>
<xml_diff>
--- a/TDD para Dynamics CE - CDS.pptx
+++ b/TDD para Dynamics CE - CDS.pptx
@@ -8,7 +8,7 @@
     <p:sldMasterId id="2147483684" r:id="rId4"/>
   </p:sldMasterIdLst>
   <p:notesMasterIdLst>
-    <p:notesMasterId r:id="rId17"/>
+    <p:notesMasterId r:id="rId23"/>
   </p:notesMasterIdLst>
   <p:sldIdLst>
     <p:sldId id="260" r:id="rId5"/>
@@ -22,7 +22,13 @@
     <p:sldId id="304" r:id="rId13"/>
     <p:sldId id="263" r:id="rId14"/>
     <p:sldId id="305" r:id="rId15"/>
-    <p:sldId id="261" r:id="rId16"/>
+    <p:sldId id="306" r:id="rId16"/>
+    <p:sldId id="311" r:id="rId17"/>
+    <p:sldId id="307" r:id="rId18"/>
+    <p:sldId id="309" r:id="rId19"/>
+    <p:sldId id="310" r:id="rId20"/>
+    <p:sldId id="308" r:id="rId21"/>
+    <p:sldId id="261" r:id="rId22"/>
   </p:sldIdLst>
   <p:sldSz cx="12192000" cy="6858000"/>
   <p:notesSz cx="6858000" cy="9144000"/>
@@ -145,6 +151,12 @@
             <p14:sldId id="304"/>
             <p14:sldId id="263"/>
             <p14:sldId id="305"/>
+            <p14:sldId id="306"/>
+            <p14:sldId id="311"/>
+            <p14:sldId id="307"/>
+            <p14:sldId id="309"/>
+            <p14:sldId id="310"/>
+            <p14:sldId id="308"/>
           </p14:sldIdLst>
         </p14:section>
         <p14:section name="Sesión V2" id="{49C7CFA0-A5C5-4477-9EDE-F0216C1F557F}">
@@ -4000,7 +4012,7 @@
           <a:p>
             <a:fld id="{E27A6381-ACC8-462A-8A9B-22568B10F0D4}" type="datetimeFigureOut">
               <a:rPr lang="es-ES" smtClean="0"/>
-              <a:t>24/05/2019</a:t>
+              <a:t>25/05/2019</a:t>
             </a:fld>
             <a:endParaRPr lang="es-ES"/>
           </a:p>
@@ -14171,7 +14183,7 @@
           <a:p>
             <a:fld id="{452821EC-DE1A-4D3B-B306-04243299C631}" type="datetimeFigureOut">
               <a:rPr lang="es-ES" smtClean="0"/>
-              <a:t>24/05/2019</a:t>
+              <a:t>25/05/2019</a:t>
             </a:fld>
             <a:endParaRPr lang="es-ES"/>
           </a:p>
@@ -14789,7 +14801,7 @@
           <a:p>
             <a:fld id="{505C796A-F1F2-4D8A-8BD0-DBB09B2D522F}" type="datetimeFigureOut">
               <a:rPr lang="es-ES" smtClean="0"/>
-              <a:t>24/05/2019</a:t>
+              <a:t>25/05/2019</a:t>
             </a:fld>
             <a:endParaRPr lang="es-ES"/>
           </a:p>
@@ -16568,6 +16580,530 @@
 </file>
 
 <file path=ppt/slides/slide12.xml><?xml version="1.0" encoding="utf-8"?>
+<p:sld xmlns:a="http://schemas.openxmlformats.org/drawingml/2006/main" xmlns:r="http://schemas.openxmlformats.org/officeDocument/2006/relationships" xmlns:p="http://schemas.openxmlformats.org/presentationml/2006/main">
+  <p:cSld>
+    <p:spTree>
+      <p:nvGrpSpPr>
+        <p:cNvPr id="1" name=""/>
+        <p:cNvGrpSpPr/>
+        <p:nvPr/>
+      </p:nvGrpSpPr>
+      <p:grpSpPr>
+        <a:xfrm>
+          <a:off x="0" y="0"/>
+          <a:ext cx="0" cy="0"/>
+          <a:chOff x="0" y="0"/>
+          <a:chExt cx="0" cy="0"/>
+        </a:xfrm>
+      </p:grpSpPr>
+      <p:sp>
+        <p:nvSpPr>
+          <p:cNvPr id="2" name="Título 1"/>
+          <p:cNvSpPr>
+            <a:spLocks noGrp="1"/>
+          </p:cNvSpPr>
+          <p:nvPr>
+            <p:ph type="title"/>
+          </p:nvPr>
+        </p:nvSpPr>
+        <p:spPr/>
+        <p:txBody>
+          <a:bodyPr/>
+          <a:lstStyle/>
+          <a:p>
+            <a:r>
+              <a:rPr lang="es-ES" dirty="0"/>
+              <a:t>Demo </a:t>
+            </a:r>
+            <a:r>
+              <a:rPr lang="es-ES" dirty="0" err="1"/>
+              <a:t>screenshots</a:t>
+            </a:r>
+            <a:endParaRPr lang="es-ES" dirty="0"/>
+          </a:p>
+        </p:txBody>
+      </p:sp>
+    </p:spTree>
+    <p:extLst>
+      <p:ext uri="{BB962C8B-B14F-4D97-AF65-F5344CB8AC3E}">
+        <p14:creationId xmlns:p14="http://schemas.microsoft.com/office/powerpoint/2010/main" val="645694114"/>
+      </p:ext>
+    </p:extLst>
+  </p:cSld>
+  <p:clrMapOvr>
+    <a:masterClrMapping/>
+  </p:clrMapOvr>
+</p:sld>
+</file>
+
+<file path=ppt/slides/slide13.xml><?xml version="1.0" encoding="utf-8"?>
+<p:sld xmlns:a="http://schemas.openxmlformats.org/drawingml/2006/main" xmlns:r="http://schemas.openxmlformats.org/officeDocument/2006/relationships" xmlns:p="http://schemas.openxmlformats.org/presentationml/2006/main">
+  <p:cSld>
+    <p:spTree>
+      <p:nvGrpSpPr>
+        <p:cNvPr id="1" name=""/>
+        <p:cNvGrpSpPr/>
+        <p:nvPr/>
+      </p:nvGrpSpPr>
+      <p:grpSpPr>
+        <a:xfrm>
+          <a:off x="0" y="0"/>
+          <a:ext cx="0" cy="0"/>
+          <a:chOff x="0" y="0"/>
+          <a:chExt cx="0" cy="0"/>
+        </a:xfrm>
+      </p:grpSpPr>
+      <p:sp>
+        <p:nvSpPr>
+          <p:cNvPr id="2" name="Título 1"/>
+          <p:cNvSpPr>
+            <a:spLocks noGrp="1"/>
+          </p:cNvSpPr>
+          <p:nvPr>
+            <p:ph type="title"/>
+          </p:nvPr>
+        </p:nvSpPr>
+        <p:spPr/>
+        <p:txBody>
+          <a:bodyPr/>
+          <a:lstStyle/>
+          <a:p>
+            <a:r>
+              <a:rPr lang="es-ES" dirty="0" err="1"/>
+              <a:t>fakexrmeasy</a:t>
+            </a:r>
+            <a:r>
+              <a:rPr lang="es-ES" dirty="0"/>
+              <a:t>: </a:t>
+            </a:r>
+            <a:r>
+              <a:rPr lang="es-ES" dirty="0" err="1"/>
+              <a:t>Setup</a:t>
+            </a:r>
+            <a:r>
+              <a:rPr lang="es-ES" dirty="0"/>
+              <a:t> </a:t>
+            </a:r>
+            <a:r>
+              <a:rPr lang="es-ES" dirty="0" err="1"/>
+              <a:t>with</a:t>
+            </a:r>
+            <a:r>
+              <a:rPr lang="es-ES" dirty="0"/>
+              <a:t> </a:t>
+            </a:r>
+            <a:r>
+              <a:rPr lang="es-ES" dirty="0" err="1"/>
+              <a:t>webpack</a:t>
+            </a:r>
+            <a:endParaRPr lang="es-ES" dirty="0"/>
+          </a:p>
+        </p:txBody>
+      </p:sp>
+      <p:pic>
+        <p:nvPicPr>
+          <p:cNvPr id="4" name="Picture 3">
+            <a:extLst>
+              <a:ext uri="{FF2B5EF4-FFF2-40B4-BE49-F238E27FC236}">
+                <a16:creationId xmlns:a16="http://schemas.microsoft.com/office/drawing/2014/main" id="{E60E27BB-9F3E-4FFF-BF1E-5561EC28D9CC}"/>
+              </a:ext>
+            </a:extLst>
+          </p:cNvPr>
+          <p:cNvPicPr>
+            <a:picLocks noChangeAspect="1"/>
+          </p:cNvPicPr>
+          <p:nvPr/>
+        </p:nvPicPr>
+        <p:blipFill>
+          <a:blip r:embed="rId2"/>
+          <a:stretch>
+            <a:fillRect/>
+          </a:stretch>
+        </p:blipFill>
+        <p:spPr>
+          <a:xfrm>
+            <a:off x="2434974" y="1133127"/>
+            <a:ext cx="6551383" cy="5630682"/>
+          </a:xfrm>
+          <a:prstGeom prst="rect">
+            <a:avLst/>
+          </a:prstGeom>
+        </p:spPr>
+      </p:pic>
+      <p:pic>
+        <p:nvPicPr>
+          <p:cNvPr id="6" name="Picture 5">
+            <a:extLst>
+              <a:ext uri="{FF2B5EF4-FFF2-40B4-BE49-F238E27FC236}">
+                <a16:creationId xmlns:a16="http://schemas.microsoft.com/office/drawing/2014/main" id="{6E280AF7-7FE2-4F6E-A6F2-3851E7289084}"/>
+              </a:ext>
+            </a:extLst>
+          </p:cNvPr>
+          <p:cNvPicPr>
+            <a:picLocks noChangeAspect="1"/>
+          </p:cNvPicPr>
+          <p:nvPr/>
+        </p:nvPicPr>
+        <p:blipFill>
+          <a:blip r:embed="rId3"/>
+          <a:stretch>
+            <a:fillRect/>
+          </a:stretch>
+        </p:blipFill>
+        <p:spPr>
+          <a:xfrm>
+            <a:off x="6298266" y="2835668"/>
+            <a:ext cx="5628854" cy="1749944"/>
+          </a:xfrm>
+          <a:prstGeom prst="rect">
+            <a:avLst/>
+          </a:prstGeom>
+        </p:spPr>
+      </p:pic>
+    </p:spTree>
+    <p:extLst>
+      <p:ext uri="{BB962C8B-B14F-4D97-AF65-F5344CB8AC3E}">
+        <p14:creationId xmlns:p14="http://schemas.microsoft.com/office/powerpoint/2010/main" val="2828995348"/>
+      </p:ext>
+    </p:extLst>
+  </p:cSld>
+  <p:clrMapOvr>
+    <a:masterClrMapping/>
+  </p:clrMapOvr>
+</p:sld>
+</file>
+
+<file path=ppt/slides/slide14.xml><?xml version="1.0" encoding="utf-8"?>
+<p:sld xmlns:a="http://schemas.openxmlformats.org/drawingml/2006/main" xmlns:r="http://schemas.openxmlformats.org/officeDocument/2006/relationships" xmlns:p="http://schemas.openxmlformats.org/presentationml/2006/main">
+  <p:cSld>
+    <p:spTree>
+      <p:nvGrpSpPr>
+        <p:cNvPr id="1" name=""/>
+        <p:cNvGrpSpPr/>
+        <p:nvPr/>
+      </p:nvGrpSpPr>
+      <p:grpSpPr>
+        <a:xfrm>
+          <a:off x="0" y="0"/>
+          <a:ext cx="0" cy="0"/>
+          <a:chOff x="0" y="0"/>
+          <a:chExt cx="0" cy="0"/>
+        </a:xfrm>
+      </p:grpSpPr>
+      <p:sp>
+        <p:nvSpPr>
+          <p:cNvPr id="2" name="Título 1"/>
+          <p:cNvSpPr>
+            <a:spLocks noGrp="1"/>
+          </p:cNvSpPr>
+          <p:nvPr>
+            <p:ph type="title"/>
+          </p:nvPr>
+        </p:nvSpPr>
+        <p:spPr/>
+        <p:txBody>
+          <a:bodyPr/>
+          <a:lstStyle/>
+          <a:p>
+            <a:r>
+              <a:rPr lang="es-ES" dirty="0" err="1"/>
+              <a:t>fakexrmeasy</a:t>
+            </a:r>
+            <a:r>
+              <a:rPr lang="es-ES" dirty="0"/>
+              <a:t> + </a:t>
+            </a:r>
+            <a:r>
+              <a:rPr lang="es-ES" dirty="0" err="1"/>
+              <a:t>xrm-mock</a:t>
+            </a:r>
+            <a:endParaRPr lang="es-ES" dirty="0"/>
+          </a:p>
+        </p:txBody>
+      </p:sp>
+      <p:pic>
+        <p:nvPicPr>
+          <p:cNvPr id="3" name="Picture 2">
+            <a:extLst>
+              <a:ext uri="{FF2B5EF4-FFF2-40B4-BE49-F238E27FC236}">
+                <a16:creationId xmlns:a16="http://schemas.microsoft.com/office/drawing/2014/main" id="{00440173-0C30-491A-A970-935F99B80F65}"/>
+              </a:ext>
+            </a:extLst>
+          </p:cNvPr>
+          <p:cNvPicPr>
+            <a:picLocks noChangeAspect="1"/>
+          </p:cNvPicPr>
+          <p:nvPr/>
+        </p:nvPicPr>
+        <p:blipFill>
+          <a:blip r:embed="rId2"/>
+          <a:stretch>
+            <a:fillRect/>
+          </a:stretch>
+        </p:blipFill>
+        <p:spPr>
+          <a:xfrm>
+            <a:off x="2352782" y="1151210"/>
+            <a:ext cx="9601403" cy="5465521"/>
+          </a:xfrm>
+          <a:prstGeom prst="rect">
+            <a:avLst/>
+          </a:prstGeom>
+        </p:spPr>
+      </p:pic>
+    </p:spTree>
+    <p:extLst>
+      <p:ext uri="{BB962C8B-B14F-4D97-AF65-F5344CB8AC3E}">
+        <p14:creationId xmlns:p14="http://schemas.microsoft.com/office/powerpoint/2010/main" val="1973644076"/>
+      </p:ext>
+    </p:extLst>
+  </p:cSld>
+  <p:clrMapOvr>
+    <a:masterClrMapping/>
+  </p:clrMapOvr>
+</p:sld>
+</file>
+
+<file path=ppt/slides/slide15.xml><?xml version="1.0" encoding="utf-8"?>
+<p:sld xmlns:a="http://schemas.openxmlformats.org/drawingml/2006/main" xmlns:r="http://schemas.openxmlformats.org/officeDocument/2006/relationships" xmlns:p="http://schemas.openxmlformats.org/presentationml/2006/main">
+  <p:cSld>
+    <p:spTree>
+      <p:nvGrpSpPr>
+        <p:cNvPr id="1" name=""/>
+        <p:cNvGrpSpPr/>
+        <p:nvPr/>
+      </p:nvGrpSpPr>
+      <p:grpSpPr>
+        <a:xfrm>
+          <a:off x="0" y="0"/>
+          <a:ext cx="0" cy="0"/>
+          <a:chOff x="0" y="0"/>
+          <a:chExt cx="0" cy="0"/>
+        </a:xfrm>
+      </p:grpSpPr>
+      <p:sp>
+        <p:nvSpPr>
+          <p:cNvPr id="2" name="Título 1"/>
+          <p:cNvSpPr>
+            <a:spLocks noGrp="1"/>
+          </p:cNvSpPr>
+          <p:nvPr>
+            <p:ph type="title"/>
+          </p:nvPr>
+        </p:nvSpPr>
+        <p:spPr/>
+        <p:txBody>
+          <a:bodyPr/>
+          <a:lstStyle/>
+          <a:p>
+            <a:r>
+              <a:rPr lang="es-ES" dirty="0" err="1"/>
+              <a:t>fakexrmeasy</a:t>
+            </a:r>
+            <a:r>
+              <a:rPr lang="es-ES" dirty="0"/>
+              <a:t> + </a:t>
+            </a:r>
+            <a:r>
+              <a:rPr lang="es-ES" dirty="0" err="1"/>
+              <a:t>xrm-mock</a:t>
+            </a:r>
+            <a:endParaRPr lang="es-ES" dirty="0"/>
+          </a:p>
+        </p:txBody>
+      </p:sp>
+      <p:pic>
+        <p:nvPicPr>
+          <p:cNvPr id="4" name="Picture 3">
+            <a:extLst>
+              <a:ext uri="{FF2B5EF4-FFF2-40B4-BE49-F238E27FC236}">
+                <a16:creationId xmlns:a16="http://schemas.microsoft.com/office/drawing/2014/main" id="{67A0B90B-F26F-4AE2-9BFE-144F24A584D9}"/>
+              </a:ext>
+            </a:extLst>
+          </p:cNvPr>
+          <p:cNvPicPr>
+            <a:picLocks noChangeAspect="1"/>
+          </p:cNvPicPr>
+          <p:nvPr/>
+        </p:nvPicPr>
+        <p:blipFill>
+          <a:blip r:embed="rId2"/>
+          <a:stretch>
+            <a:fillRect/>
+          </a:stretch>
+        </p:blipFill>
+        <p:spPr>
+          <a:xfrm>
+            <a:off x="2733774" y="1160979"/>
+            <a:ext cx="8219185" cy="5522360"/>
+          </a:xfrm>
+          <a:prstGeom prst="rect">
+            <a:avLst/>
+          </a:prstGeom>
+        </p:spPr>
+      </p:pic>
+    </p:spTree>
+    <p:extLst>
+      <p:ext uri="{BB962C8B-B14F-4D97-AF65-F5344CB8AC3E}">
+        <p14:creationId xmlns:p14="http://schemas.microsoft.com/office/powerpoint/2010/main" val="83383430"/>
+      </p:ext>
+    </p:extLst>
+  </p:cSld>
+  <p:clrMapOvr>
+    <a:masterClrMapping/>
+  </p:clrMapOvr>
+</p:sld>
+</file>
+
+<file path=ppt/slides/slide16.xml><?xml version="1.0" encoding="utf-8"?>
+<p:sld xmlns:a="http://schemas.openxmlformats.org/drawingml/2006/main" xmlns:r="http://schemas.openxmlformats.org/officeDocument/2006/relationships" xmlns:p="http://schemas.openxmlformats.org/presentationml/2006/main">
+  <p:cSld>
+    <p:spTree>
+      <p:nvGrpSpPr>
+        <p:cNvPr id="1" name=""/>
+        <p:cNvGrpSpPr/>
+        <p:nvPr/>
+      </p:nvGrpSpPr>
+      <p:grpSpPr>
+        <a:xfrm>
+          <a:off x="0" y="0"/>
+          <a:ext cx="0" cy="0"/>
+          <a:chOff x="0" y="0"/>
+          <a:chExt cx="0" cy="0"/>
+        </a:xfrm>
+      </p:grpSpPr>
+      <p:sp>
+        <p:nvSpPr>
+          <p:cNvPr id="2" name="Título 1"/>
+          <p:cNvSpPr>
+            <a:spLocks noGrp="1"/>
+          </p:cNvSpPr>
+          <p:nvPr>
+            <p:ph type="title"/>
+          </p:nvPr>
+        </p:nvSpPr>
+        <p:spPr/>
+        <p:txBody>
+          <a:bodyPr/>
+          <a:lstStyle/>
+          <a:p>
+            <a:r>
+              <a:rPr lang="es-ES" dirty="0" err="1"/>
+              <a:t>fakexrmeasy</a:t>
+            </a:r>
+            <a:r>
+              <a:rPr lang="es-ES" dirty="0"/>
+              <a:t> + </a:t>
+            </a:r>
+            <a:r>
+              <a:rPr lang="es-ES" dirty="0" err="1"/>
+              <a:t>xrm-mock</a:t>
+            </a:r>
+            <a:endParaRPr lang="es-ES" dirty="0"/>
+          </a:p>
+        </p:txBody>
+      </p:sp>
+      <p:pic>
+        <p:nvPicPr>
+          <p:cNvPr id="3" name="Picture 2">
+            <a:extLst>
+              <a:ext uri="{FF2B5EF4-FFF2-40B4-BE49-F238E27FC236}">
+                <a16:creationId xmlns:a16="http://schemas.microsoft.com/office/drawing/2014/main" id="{D773A6E8-86CB-4ED9-A379-597DB349DE0A}"/>
+              </a:ext>
+            </a:extLst>
+          </p:cNvPr>
+          <p:cNvPicPr>
+            <a:picLocks noChangeAspect="1"/>
+          </p:cNvPicPr>
+          <p:nvPr/>
+        </p:nvPicPr>
+        <p:blipFill>
+          <a:blip r:embed="rId2"/>
+          <a:stretch>
+            <a:fillRect/>
+          </a:stretch>
+        </p:blipFill>
+        <p:spPr>
+          <a:xfrm>
+            <a:off x="2593298" y="1152126"/>
+            <a:ext cx="9329762" cy="5592858"/>
+          </a:xfrm>
+          <a:prstGeom prst="rect">
+            <a:avLst/>
+          </a:prstGeom>
+        </p:spPr>
+      </p:pic>
+    </p:spTree>
+    <p:extLst>
+      <p:ext uri="{BB962C8B-B14F-4D97-AF65-F5344CB8AC3E}">
+        <p14:creationId xmlns:p14="http://schemas.microsoft.com/office/powerpoint/2010/main" val="4066633825"/>
+      </p:ext>
+    </p:extLst>
+  </p:cSld>
+  <p:clrMapOvr>
+    <a:masterClrMapping/>
+  </p:clrMapOvr>
+</p:sld>
+</file>
+
+<file path=ppt/slides/slide17.xml><?xml version="1.0" encoding="utf-8"?>
+<p:sld xmlns:a="http://schemas.openxmlformats.org/drawingml/2006/main" xmlns:r="http://schemas.openxmlformats.org/officeDocument/2006/relationships" xmlns:p="http://schemas.openxmlformats.org/presentationml/2006/main">
+  <p:cSld>
+    <p:spTree>
+      <p:nvGrpSpPr>
+        <p:cNvPr id="1" name=""/>
+        <p:cNvGrpSpPr/>
+        <p:nvPr/>
+      </p:nvGrpSpPr>
+      <p:grpSpPr>
+        <a:xfrm>
+          <a:off x="0" y="0"/>
+          <a:ext cx="0" cy="0"/>
+          <a:chOff x="0" y="0"/>
+          <a:chExt cx="0" cy="0"/>
+        </a:xfrm>
+      </p:grpSpPr>
+      <p:sp>
+        <p:nvSpPr>
+          <p:cNvPr id="2" name="Título 1"/>
+          <p:cNvSpPr>
+            <a:spLocks noGrp="1"/>
+          </p:cNvSpPr>
+          <p:nvPr>
+            <p:ph type="title"/>
+          </p:nvPr>
+        </p:nvSpPr>
+        <p:spPr/>
+        <p:txBody>
+          <a:bodyPr/>
+          <a:lstStyle/>
+          <a:p>
+            <a:r>
+              <a:rPr lang="es-ES" dirty="0"/>
+              <a:t>Demo </a:t>
+            </a:r>
+            <a:r>
+              <a:rPr lang="es-ES" dirty="0" err="1"/>
+              <a:t>screenshots</a:t>
+            </a:r>
+            <a:endParaRPr lang="es-ES" dirty="0"/>
+          </a:p>
+        </p:txBody>
+      </p:sp>
+    </p:spTree>
+    <p:extLst>
+      <p:ext uri="{BB962C8B-B14F-4D97-AF65-F5344CB8AC3E}">
+        <p14:creationId xmlns:p14="http://schemas.microsoft.com/office/powerpoint/2010/main" val="2721688549"/>
+      </p:ext>
+    </p:extLst>
+  </p:cSld>
+  <p:clrMapOvr>
+    <a:masterClrMapping/>
+  </p:clrMapOvr>
+</p:sld>
+</file>
+
+<file path=ppt/slides/slide18.xml><?xml version="1.0" encoding="utf-8"?>
 <p:sld xmlns:a="http://schemas.openxmlformats.org/drawingml/2006/main" xmlns:r="http://schemas.openxmlformats.org/officeDocument/2006/relationships" xmlns:p="http://schemas.openxmlformats.org/presentationml/2006/main">
   <p:cSld>
     <p:spTree>

</xml_diff>